<commit_message>
aggiunto link edl bot al pptx
</commit_message>
<xml_diff>
--- a/Carlo Sconti.pptx
+++ b/Carlo Sconti.pptx
@@ -107,6 +107,11 @@
       </a:defRPr>
     </a:lvl9pPr>
   </p:defaultTextStyle>
+  <p:extLst>
+    <p:ext uri="{EFAFB233-063F-42B5-8137-9DF3F51BA10A}">
+      <p15:sldGuideLst xmlns:p15="http://schemas.microsoft.com/office/powerpoint/2012/main"/>
+    </p:ext>
+  </p:extLst>
 </p:presentation>
 </file>
 
@@ -3924,6 +3929,7 @@
       <p:pic>
         <p:nvPicPr>
           <p:cNvPr id="3" name="Immagine 2">
+            <a:hlinkClick r:id="rId3"/>
             <a:extLst>
               <a:ext uri="{FF2B5EF4-FFF2-40B4-BE49-F238E27FC236}">
                 <a16:creationId xmlns:a16="http://schemas.microsoft.com/office/drawing/2014/main" id="{3FD848FA-EBC1-2743-5F21-7BAF077C0037}"/>
@@ -3936,7 +3942,7 @@
           <p:nvPr/>
         </p:nvPicPr>
         <p:blipFill>
-          <a:blip r:embed="rId3">
+          <a:blip r:embed="rId4">
             <a:extLst>
               <a:ext uri="{28A0092B-C50C-407E-A947-70E740481C1C}">
                 <a14:useLocalDpi xmlns:a14="http://schemas.microsoft.com/office/drawing/2010/main" val="0"/>

</xml_diff>

<commit_message>
modifiche suggerite da nic
</commit_message>
<xml_diff>
--- a/Carlo Sconti.pptx
+++ b/Carlo Sconti.pptx
@@ -3730,7 +3730,7 @@
                 </a:solidFill>
                 <a:latin typeface="Verdana "/>
               </a:rPr>
-              <a:t>Dare dei video/messaggi come risposte,</a:t>
+              <a:t>Dare dei video/messaggi come risposte;</a:t>
             </a:r>
           </a:p>
           <a:p>
@@ -3753,7 +3753,7 @@
                 </a:solidFill>
                 <a:latin typeface="Verdana "/>
               </a:rPr>
-              <a:t>Più giocatori,</a:t>
+              <a:t>Più giocatori;</a:t>
             </a:r>
           </a:p>
           <a:p>
@@ -3780,8 +3780,23 @@
                 </a:solidFill>
                 <a:latin typeface="Verdana "/>
               </a:rPr>
-              <a:t>Domande e risposte scritte male e</a:t>
-            </a:r>
+              <a:t>Domande e risposte </a:t>
+            </a:r>
+            <a:r>
+              <a:rPr lang="it-IT" sz="2000">
+                <a:solidFill>
+                  <a:schemeClr val="bg1"/>
+                </a:solidFill>
+                <a:latin typeface="Verdana "/>
+              </a:rPr>
+              <a:t>scritte male;</a:t>
+            </a:r>
+            <a:endParaRPr lang="it-IT" sz="2000" dirty="0">
+              <a:solidFill>
+                <a:schemeClr val="bg1"/>
+              </a:solidFill>
+              <a:latin typeface="Verdana "/>
+            </a:endParaRPr>
           </a:p>
           <a:p>
             <a:endParaRPr lang="it-IT" sz="2000" dirty="0">

</xml_diff>